<commit_message>
adding gallery : thumbnaisl, python script ot generate html, javascript lib
</commit_message>
<xml_diff>
--- a/design/lit_au_dim_lean.pptx
+++ b/design/lit_au_dim_lean.pptx
@@ -106,6 +106,22 @@
       </a:defRPr>
     </a:lvl9pPr>
   </p:defaultTextStyle>
+  <p:extLst>
+    <p:ext uri="{EFAFB233-063F-42B5-8137-9DF3F51BA10A}">
+      <p15:sldGuideLst xmlns:p15="http://schemas.microsoft.com/office/powerpoint/2012/main">
+        <p15:guide id="1" orient="horz" pos="2160">
+          <p15:clr>
+            <a:srgbClr val="A4A3A4"/>
+          </p15:clr>
+        </p15:guide>
+        <p15:guide id="2" pos="2880">
+          <p15:clr>
+            <a:srgbClr val="A4A3A4"/>
+          </p15:clr>
+        </p15:guide>
+      </p15:sldGuideLst>
+    </p:ext>
+  </p:extLst>
 </p:presentation>
 </file>
 
@@ -147,7 +163,7 @@
           <a:lstStyle/>
           <a:p>
             <a:r>
-              <a:rPr lang="en-US" smtClean="0"/>
+              <a:rPr lang="en-US"/>
               <a:t>Click to edit Master title style</a:t>
             </a:r>
             <a:endParaRPr lang="fr-FR"/>
@@ -266,7 +282,7 @@
           </a:lstStyle>
           <a:p>
             <a:r>
-              <a:rPr lang="en-US" smtClean="0"/>
+              <a:rPr lang="en-US"/>
               <a:t>Click to edit Master subtitle style</a:t>
             </a:r>
             <a:endParaRPr lang="fr-FR"/>
@@ -290,7 +306,7 @@
           <a:p>
             <a:fld id="{F4EDE48F-46AB-4D75-995A-74F58AD0ECAF}" type="datetimeFigureOut">
               <a:rPr lang="fr-FR" smtClean="0"/>
-              <a:t>20/05/2015</a:t>
+              <a:t>01/04/2017</a:t>
             </a:fld>
             <a:endParaRPr lang="fr-FR"/>
           </a:p>
@@ -332,7 +348,7 @@
           <a:p>
             <a:fld id="{C13E2C2E-5529-44AD-A64C-5B88002E8FEE}" type="slidenum">
               <a:rPr lang="fr-FR" smtClean="0"/>
-              <a:t>‹#›</a:t>
+              <a:t>‹N°›</a:t>
             </a:fld>
             <a:endParaRPr lang="fr-FR"/>
           </a:p>
@@ -384,7 +400,7 @@
           <a:lstStyle/>
           <a:p>
             <a:r>
-              <a:rPr lang="en-US" smtClean="0"/>
+              <a:rPr lang="en-US"/>
               <a:t>Click to edit Master title style</a:t>
             </a:r>
             <a:endParaRPr lang="fr-FR"/>
@@ -408,35 +424,35 @@
           <a:p>
             <a:pPr lvl="0"/>
             <a:r>
-              <a:rPr lang="en-US" smtClean="0"/>
+              <a:rPr lang="en-US"/>
               <a:t>Click to edit Master text styles</a:t>
             </a:r>
           </a:p>
           <a:p>
             <a:pPr lvl="1"/>
             <a:r>
-              <a:rPr lang="en-US" smtClean="0"/>
+              <a:rPr lang="en-US"/>
               <a:t>Second level</a:t>
             </a:r>
           </a:p>
           <a:p>
             <a:pPr lvl="2"/>
             <a:r>
-              <a:rPr lang="en-US" smtClean="0"/>
+              <a:rPr lang="en-US"/>
               <a:t>Third level</a:t>
             </a:r>
           </a:p>
           <a:p>
             <a:pPr lvl="3"/>
             <a:r>
-              <a:rPr lang="en-US" smtClean="0"/>
+              <a:rPr lang="en-US"/>
               <a:t>Fourth level</a:t>
             </a:r>
           </a:p>
           <a:p>
             <a:pPr lvl="4"/>
             <a:r>
-              <a:rPr lang="en-US" smtClean="0"/>
+              <a:rPr lang="en-US"/>
               <a:t>Fifth level</a:t>
             </a:r>
             <a:endParaRPr lang="fr-FR"/>
@@ -460,7 +476,7 @@
           <a:p>
             <a:fld id="{F4EDE48F-46AB-4D75-995A-74F58AD0ECAF}" type="datetimeFigureOut">
               <a:rPr lang="fr-FR" smtClean="0"/>
-              <a:t>20/05/2015</a:t>
+              <a:t>01/04/2017</a:t>
             </a:fld>
             <a:endParaRPr lang="fr-FR"/>
           </a:p>
@@ -502,7 +518,7 @@
           <a:p>
             <a:fld id="{C13E2C2E-5529-44AD-A64C-5B88002E8FEE}" type="slidenum">
               <a:rPr lang="fr-FR" smtClean="0"/>
-              <a:t>‹#›</a:t>
+              <a:t>‹N°›</a:t>
             </a:fld>
             <a:endParaRPr lang="fr-FR"/>
           </a:p>
@@ -559,7 +575,7 @@
           <a:lstStyle/>
           <a:p>
             <a:r>
-              <a:rPr lang="en-US" smtClean="0"/>
+              <a:rPr lang="en-US"/>
               <a:t>Click to edit Master title style</a:t>
             </a:r>
             <a:endParaRPr lang="fr-FR"/>
@@ -588,35 +604,35 @@
           <a:p>
             <a:pPr lvl="0"/>
             <a:r>
-              <a:rPr lang="en-US" smtClean="0"/>
+              <a:rPr lang="en-US"/>
               <a:t>Click to edit Master text styles</a:t>
             </a:r>
           </a:p>
           <a:p>
             <a:pPr lvl="1"/>
             <a:r>
-              <a:rPr lang="en-US" smtClean="0"/>
+              <a:rPr lang="en-US"/>
               <a:t>Second level</a:t>
             </a:r>
           </a:p>
           <a:p>
             <a:pPr lvl="2"/>
             <a:r>
-              <a:rPr lang="en-US" smtClean="0"/>
+              <a:rPr lang="en-US"/>
               <a:t>Third level</a:t>
             </a:r>
           </a:p>
           <a:p>
             <a:pPr lvl="3"/>
             <a:r>
-              <a:rPr lang="en-US" smtClean="0"/>
+              <a:rPr lang="en-US"/>
               <a:t>Fourth level</a:t>
             </a:r>
           </a:p>
           <a:p>
             <a:pPr lvl="4"/>
             <a:r>
-              <a:rPr lang="en-US" smtClean="0"/>
+              <a:rPr lang="en-US"/>
               <a:t>Fifth level</a:t>
             </a:r>
             <a:endParaRPr lang="fr-FR"/>
@@ -640,7 +656,7 @@
           <a:p>
             <a:fld id="{F4EDE48F-46AB-4D75-995A-74F58AD0ECAF}" type="datetimeFigureOut">
               <a:rPr lang="fr-FR" smtClean="0"/>
-              <a:t>20/05/2015</a:t>
+              <a:t>01/04/2017</a:t>
             </a:fld>
             <a:endParaRPr lang="fr-FR"/>
           </a:p>
@@ -682,7 +698,7 @@
           <a:p>
             <a:fld id="{C13E2C2E-5529-44AD-A64C-5B88002E8FEE}" type="slidenum">
               <a:rPr lang="fr-FR" smtClean="0"/>
-              <a:t>‹#›</a:t>
+              <a:t>‹N°›</a:t>
             </a:fld>
             <a:endParaRPr lang="fr-FR"/>
           </a:p>
@@ -734,7 +750,7 @@
           <a:lstStyle/>
           <a:p>
             <a:r>
-              <a:rPr lang="en-US" smtClean="0"/>
+              <a:rPr lang="en-US"/>
               <a:t>Click to edit Master title style</a:t>
             </a:r>
             <a:endParaRPr lang="fr-FR"/>
@@ -758,35 +774,35 @@
           <a:p>
             <a:pPr lvl="0"/>
             <a:r>
-              <a:rPr lang="en-US" smtClean="0"/>
+              <a:rPr lang="en-US"/>
               <a:t>Click to edit Master text styles</a:t>
             </a:r>
           </a:p>
           <a:p>
             <a:pPr lvl="1"/>
             <a:r>
-              <a:rPr lang="en-US" smtClean="0"/>
+              <a:rPr lang="en-US"/>
               <a:t>Second level</a:t>
             </a:r>
           </a:p>
           <a:p>
             <a:pPr lvl="2"/>
             <a:r>
-              <a:rPr lang="en-US" smtClean="0"/>
+              <a:rPr lang="en-US"/>
               <a:t>Third level</a:t>
             </a:r>
           </a:p>
           <a:p>
             <a:pPr lvl="3"/>
             <a:r>
-              <a:rPr lang="en-US" smtClean="0"/>
+              <a:rPr lang="en-US"/>
               <a:t>Fourth level</a:t>
             </a:r>
           </a:p>
           <a:p>
             <a:pPr lvl="4"/>
             <a:r>
-              <a:rPr lang="en-US" smtClean="0"/>
+              <a:rPr lang="en-US"/>
               <a:t>Fifth level</a:t>
             </a:r>
             <a:endParaRPr lang="fr-FR"/>
@@ -810,7 +826,7 @@
           <a:p>
             <a:fld id="{F4EDE48F-46AB-4D75-995A-74F58AD0ECAF}" type="datetimeFigureOut">
               <a:rPr lang="fr-FR" smtClean="0"/>
-              <a:t>20/05/2015</a:t>
+              <a:t>01/04/2017</a:t>
             </a:fld>
             <a:endParaRPr lang="fr-FR"/>
           </a:p>
@@ -852,7 +868,7 @@
           <a:p>
             <a:fld id="{C13E2C2E-5529-44AD-A64C-5B88002E8FEE}" type="slidenum">
               <a:rPr lang="fr-FR" smtClean="0"/>
-              <a:t>‹#›</a:t>
+              <a:t>‹N°›</a:t>
             </a:fld>
             <a:endParaRPr lang="fr-FR"/>
           </a:p>
@@ -913,7 +929,7 @@
           </a:lstStyle>
           <a:p>
             <a:r>
-              <a:rPr lang="en-US" smtClean="0"/>
+              <a:rPr lang="en-US"/>
               <a:t>Click to edit Master title style</a:t>
             </a:r>
             <a:endParaRPr lang="fr-FR"/>
@@ -1033,7 +1049,7 @@
           <a:p>
             <a:pPr lvl="0"/>
             <a:r>
-              <a:rPr lang="en-US" smtClean="0"/>
+              <a:rPr lang="en-US"/>
               <a:t>Click to edit Master text styles</a:t>
             </a:r>
           </a:p>
@@ -1056,7 +1072,7 @@
           <a:p>
             <a:fld id="{F4EDE48F-46AB-4D75-995A-74F58AD0ECAF}" type="datetimeFigureOut">
               <a:rPr lang="fr-FR" smtClean="0"/>
-              <a:t>20/05/2015</a:t>
+              <a:t>01/04/2017</a:t>
             </a:fld>
             <a:endParaRPr lang="fr-FR"/>
           </a:p>
@@ -1098,7 +1114,7 @@
           <a:p>
             <a:fld id="{C13E2C2E-5529-44AD-A64C-5B88002E8FEE}" type="slidenum">
               <a:rPr lang="fr-FR" smtClean="0"/>
-              <a:t>‹#›</a:t>
+              <a:t>‹N°›</a:t>
             </a:fld>
             <a:endParaRPr lang="fr-FR"/>
           </a:p>
@@ -1150,7 +1166,7 @@
           <a:lstStyle/>
           <a:p>
             <a:r>
-              <a:rPr lang="en-US" smtClean="0"/>
+              <a:rPr lang="en-US"/>
               <a:t>Click to edit Master title style</a:t>
             </a:r>
             <a:endParaRPr lang="fr-FR"/>
@@ -1207,35 +1223,35 @@
           <a:p>
             <a:pPr lvl="0"/>
             <a:r>
-              <a:rPr lang="en-US" smtClean="0"/>
+              <a:rPr lang="en-US"/>
               <a:t>Click to edit Master text styles</a:t>
             </a:r>
           </a:p>
           <a:p>
             <a:pPr lvl="1"/>
             <a:r>
-              <a:rPr lang="en-US" smtClean="0"/>
+              <a:rPr lang="en-US"/>
               <a:t>Second level</a:t>
             </a:r>
           </a:p>
           <a:p>
             <a:pPr lvl="2"/>
             <a:r>
-              <a:rPr lang="en-US" smtClean="0"/>
+              <a:rPr lang="en-US"/>
               <a:t>Third level</a:t>
             </a:r>
           </a:p>
           <a:p>
             <a:pPr lvl="3"/>
             <a:r>
-              <a:rPr lang="en-US" smtClean="0"/>
+              <a:rPr lang="en-US"/>
               <a:t>Fourth level</a:t>
             </a:r>
           </a:p>
           <a:p>
             <a:pPr lvl="4"/>
             <a:r>
-              <a:rPr lang="en-US" smtClean="0"/>
+              <a:rPr lang="en-US"/>
               <a:t>Fifth level</a:t>
             </a:r>
             <a:endParaRPr lang="fr-FR"/>
@@ -1292,35 +1308,35 @@
           <a:p>
             <a:pPr lvl="0"/>
             <a:r>
-              <a:rPr lang="en-US" smtClean="0"/>
+              <a:rPr lang="en-US"/>
               <a:t>Click to edit Master text styles</a:t>
             </a:r>
           </a:p>
           <a:p>
             <a:pPr lvl="1"/>
             <a:r>
-              <a:rPr lang="en-US" smtClean="0"/>
+              <a:rPr lang="en-US"/>
               <a:t>Second level</a:t>
             </a:r>
           </a:p>
           <a:p>
             <a:pPr lvl="2"/>
             <a:r>
-              <a:rPr lang="en-US" smtClean="0"/>
+              <a:rPr lang="en-US"/>
               <a:t>Third level</a:t>
             </a:r>
           </a:p>
           <a:p>
             <a:pPr lvl="3"/>
             <a:r>
-              <a:rPr lang="en-US" smtClean="0"/>
+              <a:rPr lang="en-US"/>
               <a:t>Fourth level</a:t>
             </a:r>
           </a:p>
           <a:p>
             <a:pPr lvl="4"/>
             <a:r>
-              <a:rPr lang="en-US" smtClean="0"/>
+              <a:rPr lang="en-US"/>
               <a:t>Fifth level</a:t>
             </a:r>
             <a:endParaRPr lang="fr-FR"/>
@@ -1344,7 +1360,7 @@
           <a:p>
             <a:fld id="{F4EDE48F-46AB-4D75-995A-74F58AD0ECAF}" type="datetimeFigureOut">
               <a:rPr lang="fr-FR" smtClean="0"/>
-              <a:t>20/05/2015</a:t>
+              <a:t>01/04/2017</a:t>
             </a:fld>
             <a:endParaRPr lang="fr-FR"/>
           </a:p>
@@ -1386,7 +1402,7 @@
           <a:p>
             <a:fld id="{C13E2C2E-5529-44AD-A64C-5B88002E8FEE}" type="slidenum">
               <a:rPr lang="fr-FR" smtClean="0"/>
-              <a:t>‹#›</a:t>
+              <a:t>‹N°›</a:t>
             </a:fld>
             <a:endParaRPr lang="fr-FR"/>
           </a:p>
@@ -1442,7 +1458,7 @@
           </a:lstStyle>
           <a:p>
             <a:r>
-              <a:rPr lang="en-US" smtClean="0"/>
+              <a:rPr lang="en-US"/>
               <a:t>Click to edit Master title style</a:t>
             </a:r>
             <a:endParaRPr lang="fr-FR"/>
@@ -1508,7 +1524,7 @@
           <a:p>
             <a:pPr lvl="0"/>
             <a:r>
-              <a:rPr lang="en-US" smtClean="0"/>
+              <a:rPr lang="en-US"/>
               <a:t>Click to edit Master text styles</a:t>
             </a:r>
           </a:p>
@@ -1564,35 +1580,35 @@
           <a:p>
             <a:pPr lvl="0"/>
             <a:r>
-              <a:rPr lang="en-US" smtClean="0"/>
+              <a:rPr lang="en-US"/>
               <a:t>Click to edit Master text styles</a:t>
             </a:r>
           </a:p>
           <a:p>
             <a:pPr lvl="1"/>
             <a:r>
-              <a:rPr lang="en-US" smtClean="0"/>
+              <a:rPr lang="en-US"/>
               <a:t>Second level</a:t>
             </a:r>
           </a:p>
           <a:p>
             <a:pPr lvl="2"/>
             <a:r>
-              <a:rPr lang="en-US" smtClean="0"/>
+              <a:rPr lang="en-US"/>
               <a:t>Third level</a:t>
             </a:r>
           </a:p>
           <a:p>
             <a:pPr lvl="3"/>
             <a:r>
-              <a:rPr lang="en-US" smtClean="0"/>
+              <a:rPr lang="en-US"/>
               <a:t>Fourth level</a:t>
             </a:r>
           </a:p>
           <a:p>
             <a:pPr lvl="4"/>
             <a:r>
-              <a:rPr lang="en-US" smtClean="0"/>
+              <a:rPr lang="en-US"/>
               <a:t>Fifth level</a:t>
             </a:r>
             <a:endParaRPr lang="fr-FR"/>
@@ -1658,7 +1674,7 @@
           <a:p>
             <a:pPr lvl="0"/>
             <a:r>
-              <a:rPr lang="en-US" smtClean="0"/>
+              <a:rPr lang="en-US"/>
               <a:t>Click to edit Master text styles</a:t>
             </a:r>
           </a:p>
@@ -1714,35 +1730,35 @@
           <a:p>
             <a:pPr lvl="0"/>
             <a:r>
-              <a:rPr lang="en-US" smtClean="0"/>
+              <a:rPr lang="en-US"/>
               <a:t>Click to edit Master text styles</a:t>
             </a:r>
           </a:p>
           <a:p>
             <a:pPr lvl="1"/>
             <a:r>
-              <a:rPr lang="en-US" smtClean="0"/>
+              <a:rPr lang="en-US"/>
               <a:t>Second level</a:t>
             </a:r>
           </a:p>
           <a:p>
             <a:pPr lvl="2"/>
             <a:r>
-              <a:rPr lang="en-US" smtClean="0"/>
+              <a:rPr lang="en-US"/>
               <a:t>Third level</a:t>
             </a:r>
           </a:p>
           <a:p>
             <a:pPr lvl="3"/>
             <a:r>
-              <a:rPr lang="en-US" smtClean="0"/>
+              <a:rPr lang="en-US"/>
               <a:t>Fourth level</a:t>
             </a:r>
           </a:p>
           <a:p>
             <a:pPr lvl="4"/>
             <a:r>
-              <a:rPr lang="en-US" smtClean="0"/>
+              <a:rPr lang="en-US"/>
               <a:t>Fifth level</a:t>
             </a:r>
             <a:endParaRPr lang="fr-FR"/>
@@ -1766,7 +1782,7 @@
           <a:p>
             <a:fld id="{F4EDE48F-46AB-4D75-995A-74F58AD0ECAF}" type="datetimeFigureOut">
               <a:rPr lang="fr-FR" smtClean="0"/>
-              <a:t>20/05/2015</a:t>
+              <a:t>01/04/2017</a:t>
             </a:fld>
             <a:endParaRPr lang="fr-FR"/>
           </a:p>
@@ -1808,7 +1824,7 @@
           <a:p>
             <a:fld id="{C13E2C2E-5529-44AD-A64C-5B88002E8FEE}" type="slidenum">
               <a:rPr lang="fr-FR" smtClean="0"/>
-              <a:t>‹#›</a:t>
+              <a:t>‹N°›</a:t>
             </a:fld>
             <a:endParaRPr lang="fr-FR"/>
           </a:p>
@@ -1860,7 +1876,7 @@
           <a:lstStyle/>
           <a:p>
             <a:r>
-              <a:rPr lang="en-US" smtClean="0"/>
+              <a:rPr lang="en-US"/>
               <a:t>Click to edit Master title style</a:t>
             </a:r>
             <a:endParaRPr lang="fr-FR"/>
@@ -1884,7 +1900,7 @@
           <a:p>
             <a:fld id="{F4EDE48F-46AB-4D75-995A-74F58AD0ECAF}" type="datetimeFigureOut">
               <a:rPr lang="fr-FR" smtClean="0"/>
-              <a:t>20/05/2015</a:t>
+              <a:t>01/04/2017</a:t>
             </a:fld>
             <a:endParaRPr lang="fr-FR"/>
           </a:p>
@@ -1926,7 +1942,7 @@
           <a:p>
             <a:fld id="{C13E2C2E-5529-44AD-A64C-5B88002E8FEE}" type="slidenum">
               <a:rPr lang="fr-FR" smtClean="0"/>
-              <a:t>‹#›</a:t>
+              <a:t>‹N°›</a:t>
             </a:fld>
             <a:endParaRPr lang="fr-FR"/>
           </a:p>
@@ -1979,7 +1995,7 @@
           <a:p>
             <a:fld id="{F4EDE48F-46AB-4D75-995A-74F58AD0ECAF}" type="datetimeFigureOut">
               <a:rPr lang="fr-FR" smtClean="0"/>
-              <a:t>20/05/2015</a:t>
+              <a:t>01/04/2017</a:t>
             </a:fld>
             <a:endParaRPr lang="fr-FR"/>
           </a:p>
@@ -2021,7 +2037,7 @@
           <a:p>
             <a:fld id="{C13E2C2E-5529-44AD-A64C-5B88002E8FEE}" type="slidenum">
               <a:rPr lang="fr-FR" smtClean="0"/>
-              <a:t>‹#›</a:t>
+              <a:t>‹N°›</a:t>
             </a:fld>
             <a:endParaRPr lang="fr-FR"/>
           </a:p>
@@ -2082,7 +2098,7 @@
           </a:lstStyle>
           <a:p>
             <a:r>
-              <a:rPr lang="en-US" smtClean="0"/>
+              <a:rPr lang="en-US"/>
               <a:t>Click to edit Master title style</a:t>
             </a:r>
             <a:endParaRPr lang="fr-FR"/>
@@ -2139,35 +2155,35 @@
           <a:p>
             <a:pPr lvl="0"/>
             <a:r>
-              <a:rPr lang="en-US" smtClean="0"/>
+              <a:rPr lang="en-US"/>
               <a:t>Click to edit Master text styles</a:t>
             </a:r>
           </a:p>
           <a:p>
             <a:pPr lvl="1"/>
             <a:r>
-              <a:rPr lang="en-US" smtClean="0"/>
+              <a:rPr lang="en-US"/>
               <a:t>Second level</a:t>
             </a:r>
           </a:p>
           <a:p>
             <a:pPr lvl="2"/>
             <a:r>
-              <a:rPr lang="en-US" smtClean="0"/>
+              <a:rPr lang="en-US"/>
               <a:t>Third level</a:t>
             </a:r>
           </a:p>
           <a:p>
             <a:pPr lvl="3"/>
             <a:r>
-              <a:rPr lang="en-US" smtClean="0"/>
+              <a:rPr lang="en-US"/>
               <a:t>Fourth level</a:t>
             </a:r>
           </a:p>
           <a:p>
             <a:pPr lvl="4"/>
             <a:r>
-              <a:rPr lang="en-US" smtClean="0"/>
+              <a:rPr lang="en-US"/>
               <a:t>Fifth level</a:t>
             </a:r>
             <a:endParaRPr lang="fr-FR"/>
@@ -2233,7 +2249,7 @@
           <a:p>
             <a:pPr lvl="0"/>
             <a:r>
-              <a:rPr lang="en-US" smtClean="0"/>
+              <a:rPr lang="en-US"/>
               <a:t>Click to edit Master text styles</a:t>
             </a:r>
           </a:p>
@@ -2256,7 +2272,7 @@
           <a:p>
             <a:fld id="{F4EDE48F-46AB-4D75-995A-74F58AD0ECAF}" type="datetimeFigureOut">
               <a:rPr lang="fr-FR" smtClean="0"/>
-              <a:t>20/05/2015</a:t>
+              <a:t>01/04/2017</a:t>
             </a:fld>
             <a:endParaRPr lang="fr-FR"/>
           </a:p>
@@ -2298,7 +2314,7 @@
           <a:p>
             <a:fld id="{C13E2C2E-5529-44AD-A64C-5B88002E8FEE}" type="slidenum">
               <a:rPr lang="fr-FR" smtClean="0"/>
-              <a:t>‹#›</a:t>
+              <a:t>‹N°›</a:t>
             </a:fld>
             <a:endParaRPr lang="fr-FR"/>
           </a:p>
@@ -2359,7 +2375,7 @@
           </a:lstStyle>
           <a:p>
             <a:r>
-              <a:rPr lang="en-US" smtClean="0"/>
+              <a:rPr lang="en-US"/>
               <a:t>Click to edit Master title style</a:t>
             </a:r>
             <a:endParaRPr lang="fr-FR"/>
@@ -2486,7 +2502,7 @@
           <a:p>
             <a:pPr lvl="0"/>
             <a:r>
-              <a:rPr lang="en-US" smtClean="0"/>
+              <a:rPr lang="en-US"/>
               <a:t>Click to edit Master text styles</a:t>
             </a:r>
           </a:p>
@@ -2509,7 +2525,7 @@
           <a:p>
             <a:fld id="{F4EDE48F-46AB-4D75-995A-74F58AD0ECAF}" type="datetimeFigureOut">
               <a:rPr lang="fr-FR" smtClean="0"/>
-              <a:t>20/05/2015</a:t>
+              <a:t>01/04/2017</a:t>
             </a:fld>
             <a:endParaRPr lang="fr-FR"/>
           </a:p>
@@ -2551,7 +2567,7 @@
           <a:p>
             <a:fld id="{C13E2C2E-5529-44AD-A64C-5B88002E8FEE}" type="slidenum">
               <a:rPr lang="fr-FR" smtClean="0"/>
-              <a:t>‹#›</a:t>
+              <a:t>‹N°›</a:t>
             </a:fld>
             <a:endParaRPr lang="fr-FR"/>
           </a:p>
@@ -2618,7 +2634,7 @@
           <a:lstStyle/>
           <a:p>
             <a:r>
-              <a:rPr lang="en-US" smtClean="0"/>
+              <a:rPr lang="en-US"/>
               <a:t>Click to edit Master title style</a:t>
             </a:r>
             <a:endParaRPr lang="fr-FR"/>
@@ -2652,35 +2668,35 @@
           <a:p>
             <a:pPr lvl="0"/>
             <a:r>
-              <a:rPr lang="en-US" smtClean="0"/>
+              <a:rPr lang="en-US"/>
               <a:t>Click to edit Master text styles</a:t>
             </a:r>
           </a:p>
           <a:p>
             <a:pPr lvl="1"/>
             <a:r>
-              <a:rPr lang="en-US" smtClean="0"/>
+              <a:rPr lang="en-US"/>
               <a:t>Second level</a:t>
             </a:r>
           </a:p>
           <a:p>
             <a:pPr lvl="2"/>
             <a:r>
-              <a:rPr lang="en-US" smtClean="0"/>
+              <a:rPr lang="en-US"/>
               <a:t>Third level</a:t>
             </a:r>
           </a:p>
           <a:p>
             <a:pPr lvl="3"/>
             <a:r>
-              <a:rPr lang="en-US" smtClean="0"/>
+              <a:rPr lang="en-US"/>
               <a:t>Fourth level</a:t>
             </a:r>
           </a:p>
           <a:p>
             <a:pPr lvl="4"/>
             <a:r>
-              <a:rPr lang="en-US" smtClean="0"/>
+              <a:rPr lang="en-US"/>
               <a:t>Fifth level</a:t>
             </a:r>
             <a:endParaRPr lang="fr-FR"/>
@@ -2722,7 +2738,7 @@
           <a:p>
             <a:fld id="{F4EDE48F-46AB-4D75-995A-74F58AD0ECAF}" type="datetimeFigureOut">
               <a:rPr lang="fr-FR" smtClean="0"/>
-              <a:t>20/05/2015</a:t>
+              <a:t>01/04/2017</a:t>
             </a:fld>
             <a:endParaRPr lang="fr-FR"/>
           </a:p>
@@ -2800,7 +2816,7 @@
           <a:p>
             <a:fld id="{C13E2C2E-5529-44AD-A64C-5B88002E8FEE}" type="slidenum">
               <a:rPr lang="fr-FR" smtClean="0"/>
-              <a:t>‹#›</a:t>
+              <a:t>‹N°›</a:t>
             </a:fld>
             <a:endParaRPr lang="fr-FR"/>
           </a:p>

</xml_diff>